<commit_message>
A few minor updates to pptx
</commit_message>
<xml_diff>
--- a/WTWY_GalaPresentation.pptx
+++ b/WTWY_GalaPresentation.pptx
@@ -110,6 +110,11 @@
       </a:defRPr>
     </a:lvl9pPr>
   </p:defaultTextStyle>
+  <p:extLst>
+    <p:ext uri="{EFAFB233-063F-42B5-8137-9DF3F51BA10A}">
+      <p15:sldGuideLst xmlns:p15="http://schemas.microsoft.com/office/powerpoint/2012/main"/>
+    </p:ext>
+  </p:extLst>
 </p:presentation>
 </file>
 
@@ -260,7 +265,7 @@
           <a:p>
             <a:fld id="{8D00CF93-AD8C-7248-B776-9EEF71C98E16}" type="datetimeFigureOut">
               <a:rPr lang="en-US" smtClean="0"/>
-              <a:t>1/7/20</a:t>
+              <a:t>1/8/20</a:t>
             </a:fld>
             <a:endParaRPr lang="en-US"/>
           </a:p>
@@ -458,7 +463,7 @@
           <a:p>
             <a:fld id="{8D00CF93-AD8C-7248-B776-9EEF71C98E16}" type="datetimeFigureOut">
               <a:rPr lang="en-US" smtClean="0"/>
-              <a:t>1/7/20</a:t>
+              <a:t>1/8/20</a:t>
             </a:fld>
             <a:endParaRPr lang="en-US"/>
           </a:p>
@@ -666,7 +671,7 @@
           <a:p>
             <a:fld id="{8D00CF93-AD8C-7248-B776-9EEF71C98E16}" type="datetimeFigureOut">
               <a:rPr lang="en-US" smtClean="0"/>
-              <a:t>1/7/20</a:t>
+              <a:t>1/8/20</a:t>
             </a:fld>
             <a:endParaRPr lang="en-US"/>
           </a:p>
@@ -864,7 +869,7 @@
           <a:p>
             <a:fld id="{8D00CF93-AD8C-7248-B776-9EEF71C98E16}" type="datetimeFigureOut">
               <a:rPr lang="en-US" smtClean="0"/>
-              <a:t>1/7/20</a:t>
+              <a:t>1/8/20</a:t>
             </a:fld>
             <a:endParaRPr lang="en-US"/>
           </a:p>
@@ -1139,7 +1144,7 @@
           <a:p>
             <a:fld id="{8D00CF93-AD8C-7248-B776-9EEF71C98E16}" type="datetimeFigureOut">
               <a:rPr lang="en-US" smtClean="0"/>
-              <a:t>1/7/20</a:t>
+              <a:t>1/8/20</a:t>
             </a:fld>
             <a:endParaRPr lang="en-US"/>
           </a:p>
@@ -1404,7 +1409,7 @@
           <a:p>
             <a:fld id="{8D00CF93-AD8C-7248-B776-9EEF71C98E16}" type="datetimeFigureOut">
               <a:rPr lang="en-US" smtClean="0"/>
-              <a:t>1/7/20</a:t>
+              <a:t>1/8/20</a:t>
             </a:fld>
             <a:endParaRPr lang="en-US"/>
           </a:p>
@@ -1816,7 +1821,7 @@
           <a:p>
             <a:fld id="{8D00CF93-AD8C-7248-B776-9EEF71C98E16}" type="datetimeFigureOut">
               <a:rPr lang="en-US" smtClean="0"/>
-              <a:t>1/7/20</a:t>
+              <a:t>1/8/20</a:t>
             </a:fld>
             <a:endParaRPr lang="en-US"/>
           </a:p>
@@ -1957,7 +1962,7 @@
           <a:p>
             <a:fld id="{8D00CF93-AD8C-7248-B776-9EEF71C98E16}" type="datetimeFigureOut">
               <a:rPr lang="en-US" smtClean="0"/>
-              <a:t>1/7/20</a:t>
+              <a:t>1/8/20</a:t>
             </a:fld>
             <a:endParaRPr lang="en-US"/>
           </a:p>
@@ -2070,7 +2075,7 @@
           <a:p>
             <a:fld id="{8D00CF93-AD8C-7248-B776-9EEF71C98E16}" type="datetimeFigureOut">
               <a:rPr lang="en-US" smtClean="0"/>
-              <a:t>1/7/20</a:t>
+              <a:t>1/8/20</a:t>
             </a:fld>
             <a:endParaRPr lang="en-US"/>
           </a:p>
@@ -2381,7 +2386,7 @@
           <a:p>
             <a:fld id="{8D00CF93-AD8C-7248-B776-9EEF71C98E16}" type="datetimeFigureOut">
               <a:rPr lang="en-US" smtClean="0"/>
-              <a:t>1/7/20</a:t>
+              <a:t>1/8/20</a:t>
             </a:fld>
             <a:endParaRPr lang="en-US"/>
           </a:p>
@@ -2669,7 +2674,7 @@
           <a:p>
             <a:fld id="{8D00CF93-AD8C-7248-B776-9EEF71C98E16}" type="datetimeFigureOut">
               <a:rPr lang="en-US" smtClean="0"/>
-              <a:t>1/7/20</a:t>
+              <a:t>1/8/20</a:t>
             </a:fld>
             <a:endParaRPr lang="en-US"/>
           </a:p>
@@ -2910,7 +2915,7 @@
           <a:p>
             <a:fld id="{8D00CF93-AD8C-7248-B776-9EEF71C98E16}" type="datetimeFigureOut">
               <a:rPr lang="en-US" smtClean="0"/>
-              <a:t>1/7/20</a:t>
+              <a:t>1/8/20</a:t>
             </a:fld>
             <a:endParaRPr lang="en-US"/>
           </a:p>
@@ -3491,6 +3496,20 @@
             </a:r>
           </a:p>
           <a:p>
+            <a:pPr lvl="1"/>
+            <a:r>
+              <a:rPr lang="en-US" dirty="0"/>
+              <a:t>To identify the highest traffic subway stations</a:t>
+            </a:r>
+          </a:p>
+          <a:p>
+            <a:pPr lvl="1"/>
+            <a:r>
+              <a:rPr lang="en-US" dirty="0"/>
+              <a:t>To identify areas with high concentration of tech companies and women’s health services</a:t>
+            </a:r>
+          </a:p>
+          <a:p>
             <a:r>
               <a:rPr lang="en-US" dirty="0"/>
               <a:t>Goals</a:t>
@@ -3826,7 +3845,16 @@
           <a:bodyPr/>
           <a:lstStyle/>
           <a:p>
-            <a:endParaRPr lang="en-US"/>
+            <a:r>
+              <a:rPr lang="en-US" dirty="0"/>
+              <a:t>We would take into consideration the location of the gala and additionally place street teams by the closest subway stations</a:t>
+            </a:r>
+          </a:p>
+          <a:p>
+            <a:pPr marL="0" indent="0">
+              <a:buNone/>
+            </a:pPr>
+            <a:endParaRPr lang="en-US" dirty="0"/>
           </a:p>
         </p:txBody>
       </p:sp>

</xml_diff>